<commit_message>
Changes to midpoint Presentation slides
</commit_message>
<xml_diff>
--- a/Midpoint Presentation/6.S079MidpointPresentation.pptx
+++ b/Midpoint Presentation/6.S079MidpointPresentation.pptx
@@ -7,15 +7,17 @@
   <p:sldIdLst>
     <p:sldId id="263" r:id="rId2"/>
     <p:sldId id="264" r:id="rId3"/>
-    <p:sldId id="257" r:id="rId4"/>
-    <p:sldId id="262" r:id="rId5"/>
-    <p:sldId id="258" r:id="rId6"/>
-    <p:sldId id="259" r:id="rId7"/>
-    <p:sldId id="260" r:id="rId8"/>
-    <p:sldId id="261" r:id="rId9"/>
-    <p:sldId id="265" r:id="rId10"/>
-    <p:sldId id="267" r:id="rId11"/>
-    <p:sldId id="266" r:id="rId12"/>
+    <p:sldId id="268" r:id="rId4"/>
+    <p:sldId id="257" r:id="rId5"/>
+    <p:sldId id="262" r:id="rId6"/>
+    <p:sldId id="258" r:id="rId7"/>
+    <p:sldId id="259" r:id="rId8"/>
+    <p:sldId id="260" r:id="rId9"/>
+    <p:sldId id="261" r:id="rId10"/>
+    <p:sldId id="265" r:id="rId11"/>
+    <p:sldId id="267" r:id="rId12"/>
+    <p:sldId id="266" r:id="rId13"/>
+    <p:sldId id="269" r:id="rId14"/>
   </p:sldIdLst>
   <p:sldSz cx="9144000" cy="6858000" type="screen4x3"/>
   <p:notesSz cx="6858000" cy="9144000"/>
@@ -3211,6 +3213,142 @@
           <a:p>
             <a:r>
               <a:rPr lang="en-US" dirty="0" smtClean="0"/>
+              <a:t>Initial Results</a:t>
+            </a:r>
+            <a:endParaRPr lang="en-US" dirty="0"/>
+          </a:p>
+        </p:txBody>
+      </p:sp>
+      <p:sp>
+        <p:nvSpPr>
+          <p:cNvPr id="3" name="Content Placeholder 2"/>
+          <p:cNvSpPr>
+            <a:spLocks noGrp="1"/>
+          </p:cNvSpPr>
+          <p:nvPr>
+            <p:ph idx="1"/>
+          </p:nvPr>
+        </p:nvSpPr>
+        <p:spPr/>
+        <p:txBody>
+          <a:bodyPr/>
+          <a:lstStyle/>
+          <a:p>
+            <a:pPr marL="0" indent="0">
+              <a:buNone/>
+            </a:pPr>
+            <a:r>
+              <a:rPr lang="en-US" dirty="0" smtClean="0"/>
+              <a:t>Demo Video</a:t>
+            </a:r>
+          </a:p>
+          <a:p>
+            <a:pPr marL="0" indent="0">
+              <a:buNone/>
+            </a:pPr>
+            <a:endParaRPr lang="en-US" dirty="0"/>
+          </a:p>
+          <a:p>
+            <a:pPr marL="0" indent="0">
+              <a:buNone/>
+            </a:pPr>
+            <a:r>
+              <a:rPr lang="en-US" dirty="0">
+                <a:hlinkClick r:id="rId2"/>
+              </a:rPr>
+              <a:t>https://</a:t>
+            </a:r>
+            <a:r>
+              <a:rPr lang="en-US" dirty="0" smtClean="0">
+                <a:hlinkClick r:id="rId2"/>
+              </a:rPr>
+              <a:t>www.youtube.com/watch?v=i7Q_NUDL1eU</a:t>
+            </a:r>
+            <a:r>
+              <a:rPr lang="en-US" dirty="0" smtClean="0"/>
+              <a:t> </a:t>
+            </a:r>
+          </a:p>
+        </p:txBody>
+      </p:sp>
+      <p:cxnSp>
+        <p:nvCxnSpPr>
+          <p:cNvPr id="4" name="Straight Connector 3"/>
+          <p:cNvCxnSpPr/>
+          <p:nvPr/>
+        </p:nvCxnSpPr>
+        <p:spPr>
+          <a:xfrm flipV="1">
+            <a:off x="0" y="1343771"/>
+            <a:ext cx="9144000" cy="1"/>
+          </a:xfrm>
+          <a:prstGeom prst="line">
+            <a:avLst/>
+          </a:prstGeom>
+          <a:ln/>
+        </p:spPr>
+        <p:style>
+          <a:lnRef idx="3">
+            <a:schemeClr val="dk1"/>
+          </a:lnRef>
+          <a:fillRef idx="0">
+            <a:schemeClr val="dk1"/>
+          </a:fillRef>
+          <a:effectRef idx="2">
+            <a:schemeClr val="dk1"/>
+          </a:effectRef>
+          <a:fontRef idx="minor">
+            <a:schemeClr val="tx1"/>
+          </a:fontRef>
+        </p:style>
+      </p:cxnSp>
+    </p:spTree>
+    <p:extLst>
+      <p:ext uri="{BB962C8B-B14F-4D97-AF65-F5344CB8AC3E}">
+        <p14:creationId xmlns:p14="http://schemas.microsoft.com/office/powerpoint/2010/main" val="3448217825"/>
+      </p:ext>
+    </p:extLst>
+  </p:cSld>
+  <p:clrMapOvr>
+    <a:masterClrMapping/>
+  </p:clrMapOvr>
+</p:sld>
+</file>
+
+<file path=ppt/slides/slide11.xml><?xml version="1.0" encoding="utf-8"?>
+<p:sld xmlns:a="http://schemas.openxmlformats.org/drawingml/2006/main" xmlns:r="http://schemas.openxmlformats.org/officeDocument/2006/relationships" xmlns:p="http://schemas.openxmlformats.org/presentationml/2006/main">
+  <p:cSld>
+    <p:spTree>
+      <p:nvGrpSpPr>
+        <p:cNvPr id="1" name=""/>
+        <p:cNvGrpSpPr/>
+        <p:nvPr/>
+      </p:nvGrpSpPr>
+      <p:grpSpPr>
+        <a:xfrm>
+          <a:off x="0" y="0"/>
+          <a:ext cx="0" cy="0"/>
+          <a:chOff x="0" y="0"/>
+          <a:chExt cx="0" cy="0"/>
+        </a:xfrm>
+      </p:grpSpPr>
+      <p:sp>
+        <p:nvSpPr>
+          <p:cNvPr id="2" name="Title 1"/>
+          <p:cNvSpPr>
+            <a:spLocks noGrp="1"/>
+          </p:cNvSpPr>
+          <p:nvPr>
+            <p:ph type="title"/>
+          </p:nvPr>
+        </p:nvSpPr>
+        <p:spPr/>
+        <p:txBody>
+          <a:bodyPr/>
+          <a:lstStyle/>
+          <a:p>
+            <a:r>
+              <a:rPr lang="en-US" dirty="0" smtClean="0"/>
               <a:t>Test Material</a:t>
             </a:r>
             <a:endParaRPr lang="en-US" dirty="0"/>
@@ -3300,7 +3438,7 @@
 </p:sld>
 </file>
 
-<file path=ppt/slides/slide11.xml><?xml version="1.0" encoding="utf-8"?>
+<file path=ppt/slides/slide12.xml><?xml version="1.0" encoding="utf-8"?>
 <p:sld xmlns:a="http://schemas.openxmlformats.org/drawingml/2006/main" xmlns:r="http://schemas.openxmlformats.org/officeDocument/2006/relationships" xmlns:p="http://schemas.openxmlformats.org/presentationml/2006/main">
   <p:cSld>
     <p:spTree>
@@ -3430,6 +3568,122 @@
     <p:extLst>
       <p:ext uri="{BB962C8B-B14F-4D97-AF65-F5344CB8AC3E}">
         <p14:creationId xmlns:p14="http://schemas.microsoft.com/office/powerpoint/2010/main" val="3396338373"/>
+      </p:ext>
+    </p:extLst>
+  </p:cSld>
+  <p:clrMapOvr>
+    <a:masterClrMapping/>
+  </p:clrMapOvr>
+</p:sld>
+</file>
+
+<file path=ppt/slides/slide13.xml><?xml version="1.0" encoding="utf-8"?>
+<p:sld xmlns:a="http://schemas.openxmlformats.org/drawingml/2006/main" xmlns:r="http://schemas.openxmlformats.org/officeDocument/2006/relationships" xmlns:p="http://schemas.openxmlformats.org/presentationml/2006/main">
+  <p:cSld>
+    <p:spTree>
+      <p:nvGrpSpPr>
+        <p:cNvPr id="1" name=""/>
+        <p:cNvGrpSpPr/>
+        <p:nvPr/>
+      </p:nvGrpSpPr>
+      <p:grpSpPr>
+        <a:xfrm>
+          <a:off x="0" y="0"/>
+          <a:ext cx="0" cy="0"/>
+          <a:chOff x="0" y="0"/>
+          <a:chExt cx="0" cy="0"/>
+        </a:xfrm>
+      </p:grpSpPr>
+      <p:sp>
+        <p:nvSpPr>
+          <p:cNvPr id="2" name="Title 1"/>
+          <p:cNvSpPr>
+            <a:spLocks noGrp="1"/>
+          </p:cNvSpPr>
+          <p:nvPr>
+            <p:ph type="title"/>
+          </p:nvPr>
+        </p:nvSpPr>
+        <p:spPr/>
+        <p:txBody>
+          <a:bodyPr/>
+          <a:lstStyle/>
+          <a:p>
+            <a:r>
+              <a:rPr lang="en-US" dirty="0" smtClean="0"/>
+              <a:t>Resources</a:t>
+            </a:r>
+            <a:endParaRPr lang="en-US" dirty="0"/>
+          </a:p>
+        </p:txBody>
+      </p:sp>
+      <p:sp>
+        <p:nvSpPr>
+          <p:cNvPr id="3" name="Content Placeholder 2"/>
+          <p:cNvSpPr>
+            <a:spLocks noGrp="1"/>
+          </p:cNvSpPr>
+          <p:nvPr>
+            <p:ph idx="1"/>
+          </p:nvPr>
+        </p:nvSpPr>
+        <p:spPr/>
+        <p:txBody>
+          <a:bodyPr/>
+          <a:lstStyle/>
+          <a:p>
+            <a:r>
+              <a:rPr lang="en-US" dirty="0" smtClean="0"/>
+              <a:t>As mentioned, thanks to Desai for some resources on Hexahedra's elements</a:t>
+            </a:r>
+          </a:p>
+          <a:p>
+            <a:r>
+              <a:rPr lang="en-US" dirty="0" smtClean="0"/>
+              <a:t>“Non-linear Continuum mechanics for finite element analysis” by </a:t>
+            </a:r>
+            <a:r>
+              <a:rPr lang="en-US" dirty="0" err="1" smtClean="0"/>
+              <a:t>Bonet</a:t>
+            </a:r>
+            <a:r>
+              <a:rPr lang="en-US" dirty="0" smtClean="0"/>
+              <a:t> and Woods</a:t>
+            </a:r>
+          </a:p>
+          <a:p>
+            <a:r>
+              <a:rPr lang="en-US" dirty="0" smtClean="0"/>
+              <a:t>Class slides and notes for 6.S079</a:t>
+            </a:r>
+          </a:p>
+          <a:p>
+            <a:r>
+              <a:rPr lang="en-US" dirty="0" smtClean="0"/>
+              <a:t>SIGRAPH 2012 course “FEM </a:t>
+            </a:r>
+            <a:r>
+              <a:rPr lang="en-US" dirty="0"/>
+              <a:t>Simulation of 3D Deformable Solids: A practitioner's guide to theory, discretization and model </a:t>
+            </a:r>
+            <a:r>
+              <a:rPr lang="en-US" dirty="0" smtClean="0"/>
+              <a:t>reduction”</a:t>
+            </a:r>
+            <a:endParaRPr lang="en-US" dirty="0"/>
+          </a:p>
+          <a:p>
+            <a:endParaRPr lang="en-US" dirty="0" smtClean="0"/>
+          </a:p>
+          <a:p>
+            <a:endParaRPr lang="en-US" dirty="0"/>
+          </a:p>
+        </p:txBody>
+      </p:sp>
+    </p:spTree>
+    <p:extLst>
+      <p:ext uri="{BB962C8B-B14F-4D97-AF65-F5344CB8AC3E}">
+        <p14:creationId xmlns:p14="http://schemas.microsoft.com/office/powerpoint/2010/main" val="3419517165"/>
       </p:ext>
     </p:extLst>
   </p:cSld>
@@ -3618,6 +3872,156 @@
             <p:ph type="title"/>
           </p:nvPr>
         </p:nvSpPr>
+        <p:spPr>
+          <a:xfrm>
+            <a:off x="304800" y="-36095"/>
+            <a:ext cx="8229600" cy="1143000"/>
+          </a:xfrm>
+        </p:spPr>
+        <p:txBody>
+          <a:bodyPr/>
+          <a:lstStyle/>
+          <a:p>
+            <a:r>
+              <a:rPr lang="en-US" dirty="0" smtClean="0"/>
+              <a:t>Derivation</a:t>
+            </a:r>
+            <a:endParaRPr lang="en-US" dirty="0"/>
+          </a:p>
+        </p:txBody>
+      </p:sp>
+      <p:sp>
+        <p:nvSpPr>
+          <p:cNvPr id="4" name="TextBox 3"/>
+          <p:cNvSpPr txBox="1"/>
+          <p:nvPr/>
+        </p:nvSpPr>
+        <p:spPr>
+          <a:xfrm>
+            <a:off x="457200" y="916464"/>
+            <a:ext cx="8415254" cy="1231106"/>
+          </a:xfrm>
+          <a:prstGeom prst="rect">
+            <a:avLst/>
+          </a:prstGeom>
+          <a:noFill/>
+        </p:spPr>
+        <p:txBody>
+          <a:bodyPr wrap="square" rtlCol="0">
+            <a:spAutoFit/>
+          </a:bodyPr>
+          <a:lstStyle/>
+          <a:p>
+            <a:pPr marL="457200" indent="-457200">
+              <a:buFont typeface="Arial" panose="020B0604020202020204" pitchFamily="34" charset="0"/>
+              <a:buChar char="•"/>
+            </a:pPr>
+            <a:r>
+              <a:rPr lang="en-US" sz="2800" dirty="0"/>
+              <a:t>Thanks to Desai Chen for resources on </a:t>
+            </a:r>
+            <a:r>
+              <a:rPr lang="en-US" sz="2800" dirty="0" smtClean="0"/>
+              <a:t>FEM theory</a:t>
+            </a:r>
+          </a:p>
+          <a:p>
+            <a:pPr marL="457200" indent="-457200">
+              <a:buFont typeface="Arial" panose="020B0604020202020204" pitchFamily="34" charset="0"/>
+              <a:buChar char="•"/>
+            </a:pPr>
+            <a:r>
+              <a:rPr lang="en-US" sz="2800" dirty="0" smtClean="0"/>
+              <a:t>We took the resources and derived hexahedral FEM</a:t>
+            </a:r>
+            <a:endParaRPr lang="en-US" sz="2800" dirty="0"/>
+          </a:p>
+          <a:p>
+            <a:endParaRPr lang="en-US" dirty="0"/>
+          </a:p>
+        </p:txBody>
+      </p:sp>
+      <p:pic>
+        <p:nvPicPr>
+          <p:cNvPr id="2052" name="Picture 4" descr="C:\Users\Lucas\AppData\Local\Temp\WP_20140419_16_21_00_Pro-2.jpg"/>
+          <p:cNvPicPr>
+            <a:picLocks noChangeAspect="1" noChangeArrowheads="1"/>
+          </p:cNvPicPr>
+          <p:nvPr/>
+        </p:nvPicPr>
+        <p:blipFill>
+          <a:blip r:embed="rId2">
+            <a:extLst>
+              <a:ext uri="{28A0092B-C50C-407E-A947-70E740481C1C}">
+                <a14:useLocalDpi xmlns:a14="http://schemas.microsoft.com/office/drawing/2010/main" val="0"/>
+              </a:ext>
+            </a:extLst>
+          </a:blip>
+          <a:srcRect/>
+          <a:stretch>
+            <a:fillRect/>
+          </a:stretch>
+        </p:blipFill>
+        <p:spPr bwMode="auto">
+          <a:xfrm>
+            <a:off x="685800" y="2147570"/>
+            <a:ext cx="7643010" cy="4305921"/>
+          </a:xfrm>
+          <a:prstGeom prst="rect">
+            <a:avLst/>
+          </a:prstGeom>
+          <a:noFill/>
+          <a:extLst>
+            <a:ext uri="{909E8E84-426E-40DD-AFC4-6F175D3DCCD1}">
+              <a14:hiddenFill xmlns:a14="http://schemas.microsoft.com/office/drawing/2010/main">
+                <a:solidFill>
+                  <a:srgbClr val="FFFFFF"/>
+                </a:solidFill>
+              </a14:hiddenFill>
+            </a:ext>
+          </a:extLst>
+        </p:spPr>
+      </p:pic>
+    </p:spTree>
+    <p:extLst>
+      <p:ext uri="{BB962C8B-B14F-4D97-AF65-F5344CB8AC3E}">
+        <p14:creationId xmlns:p14="http://schemas.microsoft.com/office/powerpoint/2010/main" val="3170403186"/>
+      </p:ext>
+    </p:extLst>
+  </p:cSld>
+  <p:clrMapOvr>
+    <a:masterClrMapping/>
+  </p:clrMapOvr>
+</p:sld>
+</file>
+
+<file path=ppt/slides/slide4.xml><?xml version="1.0" encoding="utf-8"?>
+<p:sld xmlns:a="http://schemas.openxmlformats.org/drawingml/2006/main" xmlns:r="http://schemas.openxmlformats.org/officeDocument/2006/relationships" xmlns:p="http://schemas.openxmlformats.org/presentationml/2006/main">
+  <p:cSld>
+    <p:spTree>
+      <p:nvGrpSpPr>
+        <p:cNvPr id="1" name=""/>
+        <p:cNvGrpSpPr/>
+        <p:nvPr/>
+      </p:nvGrpSpPr>
+      <p:grpSpPr>
+        <a:xfrm>
+          <a:off x="0" y="0"/>
+          <a:ext cx="0" cy="0"/>
+          <a:chOff x="0" y="0"/>
+          <a:chExt cx="0" cy="0"/>
+        </a:xfrm>
+      </p:grpSpPr>
+      <p:sp>
+        <p:nvSpPr>
+          <p:cNvPr id="2" name="Title 1"/>
+          <p:cNvSpPr>
+            <a:spLocks noGrp="1"/>
+          </p:cNvSpPr>
+          <p:nvPr>
+            <p:ph type="title"/>
+          </p:nvPr>
+        </p:nvSpPr>
         <p:spPr/>
         <p:txBody>
           <a:bodyPr>
@@ -3656,12 +4060,6 @@
           <a:lstStyle/>
           <a:p>
             <a:r>
-              <a:rPr lang="en-US" dirty="0" smtClean="0"/>
-              <a:t>Thanks to Desai Chen for resources on theory</a:t>
-            </a:r>
-          </a:p>
-          <a:p>
-            <a:r>
               <a:rPr lang="en-US" b="1" dirty="0" smtClean="0"/>
               <a:t>x </a:t>
             </a:r>
@@ -3681,8 +4079,31 @@
           <a:p>
             <a:r>
               <a:rPr lang="en-US" dirty="0" smtClean="0"/>
-              <a:t>Indirect formulation with potential energy function </a:t>
-            </a:r>
+              <a:t>Indirect formulation with </a:t>
+            </a:r>
+            <a:r>
+              <a:rPr lang="en-US" dirty="0" smtClean="0"/>
+              <a:t>potential </a:t>
+            </a:r>
+            <a:r>
+              <a:rPr lang="en-US" dirty="0" smtClean="0"/>
+              <a:t>energy </a:t>
+            </a:r>
+            <a:r>
+              <a:rPr lang="en-US" dirty="0" smtClean="0"/>
+              <a:t>function</a:t>
+            </a:r>
+          </a:p>
+          <a:p>
+            <a:r>
+              <a:rPr lang="en-US" smtClean="0"/>
+              <a:t>Force applied </a:t>
+            </a:r>
+            <a:r>
+              <a:rPr lang="en-US" dirty="0" smtClean="0"/>
+              <a:t>at vertices causes cube deformation to minimize potential energy </a:t>
+            </a:r>
+            <a:endParaRPr lang="en-US" dirty="0" smtClean="0"/>
           </a:p>
           <a:p>
             <a:pPr marL="0" indent="0">
@@ -3722,7 +4143,7 @@
         </p:blipFill>
         <p:spPr bwMode="auto">
           <a:xfrm>
-            <a:off x="2514601" y="3733800"/>
+            <a:off x="5229726" y="4754957"/>
             <a:ext cx="3886200" cy="1234285"/>
           </a:xfrm>
           <a:prstGeom prst="rect">
@@ -3753,151 +4174,166 @@
           </a:extLst>
         </p:spPr>
       </p:pic>
-      <p:pic>
-        <p:nvPicPr>
-          <p:cNvPr id="1032" name="Picture 8"/>
-          <p:cNvPicPr>
-            <a:picLocks noChangeAspect="1" noChangeArrowheads="1"/>
-          </p:cNvPicPr>
+      <p:grpSp>
+        <p:nvGrpSpPr>
+          <p:cNvPr id="4" name="Group 3"/>
+          <p:cNvGrpSpPr/>
           <p:nvPr/>
-        </p:nvPicPr>
-        <p:blipFill>
-          <a:blip r:embed="rId3">
+        </p:nvGrpSpPr>
+        <p:grpSpPr>
+          <a:xfrm>
+            <a:off x="172454" y="4343400"/>
+            <a:ext cx="5181600" cy="2057400"/>
+            <a:chOff x="1828800" y="4598918"/>
+            <a:chExt cx="5706717" cy="2295525"/>
+          </a:xfrm>
+        </p:grpSpPr>
+        <p:pic>
+          <p:nvPicPr>
+            <p:cNvPr id="1032" name="Picture 8"/>
+            <p:cNvPicPr>
+              <a:picLocks noChangeAspect="1" noChangeArrowheads="1"/>
+            </p:cNvPicPr>
+            <p:nvPr/>
+          </p:nvPicPr>
+          <p:blipFill>
+            <a:blip r:embed="rId3">
+              <a:extLst>
+                <a:ext uri="{28A0092B-C50C-407E-A947-70E740481C1C}">
+                  <a14:useLocalDpi xmlns:a14="http://schemas.microsoft.com/office/drawing/2010/main" val="0"/>
+                </a:ext>
+              </a:extLst>
+            </a:blip>
+            <a:srcRect/>
+            <a:stretch>
+              <a:fillRect/>
+            </a:stretch>
+          </p:blipFill>
+          <p:spPr bwMode="auto">
+            <a:xfrm>
+              <a:off x="1828800" y="4598918"/>
+              <a:ext cx="1771650" cy="2295525"/>
+            </a:xfrm>
+            <a:prstGeom prst="rect">
+              <a:avLst/>
+            </a:prstGeom>
+            <a:noFill/>
+            <a:ln>
+              <a:noFill/>
+            </a:ln>
             <a:extLst>
-              <a:ext uri="{28A0092B-C50C-407E-A947-70E740481C1C}">
-                <a14:useLocalDpi xmlns:a14="http://schemas.microsoft.com/office/drawing/2010/main" val="0"/>
+              <a:ext uri="{909E8E84-426E-40DD-AFC4-6F175D3DCCD1}">
+                <a14:hiddenFill xmlns:a14="http://schemas.microsoft.com/office/drawing/2010/main">
+                  <a:solidFill>
+                    <a:schemeClr val="accent1"/>
+                  </a:solidFill>
+                </a14:hiddenFill>
+              </a:ext>
+              <a:ext uri="{91240B29-F687-4F45-9708-019B960494DF}">
+                <a14:hiddenLine xmlns:a14="http://schemas.microsoft.com/office/drawing/2010/main" w="9525">
+                  <a:solidFill>
+                    <a:schemeClr val="tx1"/>
+                  </a:solidFill>
+                  <a:miter lim="800000"/>
+                  <a:headEnd/>
+                  <a:tailEnd/>
+                </a14:hiddenLine>
               </a:ext>
             </a:extLst>
-          </a:blip>
-          <a:srcRect/>
-          <a:stretch>
-            <a:fillRect/>
-          </a:stretch>
-        </p:blipFill>
-        <p:spPr bwMode="auto">
-          <a:xfrm>
-            <a:off x="1828800" y="4598918"/>
-            <a:ext cx="1771650" cy="2295525"/>
-          </a:xfrm>
-          <a:prstGeom prst="rect">
-            <a:avLst/>
-          </a:prstGeom>
-          <a:noFill/>
-          <a:ln>
+          </p:spPr>
+        </p:pic>
+        <p:cxnSp>
+          <p:nvCxnSpPr>
+            <p:cNvPr id="6" name="Straight Arrow Connector 5"/>
+            <p:cNvCxnSpPr/>
+            <p:nvPr/>
+          </p:nvCxnSpPr>
+          <p:spPr>
+            <a:xfrm flipV="1">
+              <a:off x="4267200" y="5610901"/>
+              <a:ext cx="857251" cy="1"/>
+            </a:xfrm>
+            <a:prstGeom prst="straightConnector1">
+              <a:avLst/>
+            </a:prstGeom>
+            <a:ln w="38100">
+              <a:solidFill>
+                <a:schemeClr val="tx1">
+                  <a:lumMod val="95000"/>
+                  <a:lumOff val="5000"/>
+                </a:schemeClr>
+              </a:solidFill>
+              <a:tailEnd type="arrow"/>
+            </a:ln>
+          </p:spPr>
+          <p:style>
+            <a:lnRef idx="1">
+              <a:schemeClr val="accent1"/>
+            </a:lnRef>
+            <a:fillRef idx="0">
+              <a:schemeClr val="accent1"/>
+            </a:fillRef>
+            <a:effectRef idx="0">
+              <a:schemeClr val="accent1"/>
+            </a:effectRef>
+            <a:fontRef idx="minor">
+              <a:schemeClr val="tx1"/>
+            </a:fontRef>
+          </p:style>
+        </p:cxnSp>
+        <p:pic>
+          <p:nvPicPr>
+            <p:cNvPr id="1034" name="Picture 10"/>
+            <p:cNvPicPr>
+              <a:picLocks noChangeAspect="1" noChangeArrowheads="1"/>
+            </p:cNvPicPr>
+            <p:nvPr/>
+          </p:nvPicPr>
+          <p:blipFill rotWithShape="1">
+            <a:blip r:embed="rId4">
+              <a:extLst>
+                <a:ext uri="{28A0092B-C50C-407E-A947-70E740481C1C}">
+                  <a14:useLocalDpi xmlns:a14="http://schemas.microsoft.com/office/drawing/2010/main" val="0"/>
+                </a:ext>
+              </a:extLst>
+            </a:blip>
+            <a:srcRect l="-18111" t="4727" r="18111" b="14991"/>
+            <a:stretch/>
+          </p:blipFill>
+          <p:spPr bwMode="auto">
+            <a:xfrm>
+              <a:off x="4572000" y="4730661"/>
+              <a:ext cx="2963517" cy="2032037"/>
+            </a:xfrm>
+            <a:prstGeom prst="rect">
+              <a:avLst/>
+            </a:prstGeom>
             <a:noFill/>
-          </a:ln>
-          <a:extLst>
-            <a:ext uri="{909E8E84-426E-40DD-AFC4-6F175D3DCCD1}">
-              <a14:hiddenFill xmlns:a14="http://schemas.microsoft.com/office/drawing/2010/main">
-                <a:solidFill>
-                  <a:schemeClr val="accent1"/>
-                </a:solidFill>
-              </a14:hiddenFill>
-            </a:ext>
-            <a:ext uri="{91240B29-F687-4F45-9708-019B960494DF}">
-              <a14:hiddenLine xmlns:a14="http://schemas.microsoft.com/office/drawing/2010/main" w="9525">
-                <a:solidFill>
-                  <a:schemeClr val="tx1"/>
-                </a:solidFill>
-                <a:miter lim="800000"/>
-                <a:headEnd/>
-                <a:tailEnd/>
-              </a14:hiddenLine>
-            </a:ext>
-          </a:extLst>
-        </p:spPr>
-      </p:pic>
-      <p:cxnSp>
-        <p:nvCxnSpPr>
-          <p:cNvPr id="6" name="Straight Arrow Connector 5"/>
-          <p:cNvCxnSpPr/>
-          <p:nvPr/>
-        </p:nvCxnSpPr>
-        <p:spPr>
-          <a:xfrm flipV="1">
-            <a:off x="4267200" y="5610901"/>
-            <a:ext cx="857251" cy="1"/>
-          </a:xfrm>
-          <a:prstGeom prst="straightConnector1">
-            <a:avLst/>
-          </a:prstGeom>
-          <a:ln w="38100">
-            <a:solidFill>
-              <a:schemeClr val="tx1">
-                <a:lumMod val="95000"/>
-                <a:lumOff val="5000"/>
-              </a:schemeClr>
-            </a:solidFill>
-            <a:tailEnd type="arrow"/>
-          </a:ln>
-        </p:spPr>
-        <p:style>
-          <a:lnRef idx="1">
-            <a:schemeClr val="accent1"/>
-          </a:lnRef>
-          <a:fillRef idx="0">
-            <a:schemeClr val="accent1"/>
-          </a:fillRef>
-          <a:effectRef idx="0">
-            <a:schemeClr val="accent1"/>
-          </a:effectRef>
-          <a:fontRef idx="minor">
-            <a:schemeClr val="tx1"/>
-          </a:fontRef>
-        </p:style>
-      </p:cxnSp>
-      <p:pic>
-        <p:nvPicPr>
-          <p:cNvPr id="1034" name="Picture 10"/>
-          <p:cNvPicPr>
-            <a:picLocks noChangeAspect="1" noChangeArrowheads="1"/>
-          </p:cNvPicPr>
-          <p:nvPr/>
-        </p:nvPicPr>
-        <p:blipFill rotWithShape="1">
-          <a:blip r:embed="rId4">
+            <a:ln>
+              <a:noFill/>
+            </a:ln>
             <a:extLst>
-              <a:ext uri="{28A0092B-C50C-407E-A947-70E740481C1C}">
-                <a14:useLocalDpi xmlns:a14="http://schemas.microsoft.com/office/drawing/2010/main" val="0"/>
+              <a:ext uri="{909E8E84-426E-40DD-AFC4-6F175D3DCCD1}">
+                <a14:hiddenFill xmlns:a14="http://schemas.microsoft.com/office/drawing/2010/main">
+                  <a:solidFill>
+                    <a:schemeClr val="accent1"/>
+                  </a:solidFill>
+                </a14:hiddenFill>
+              </a:ext>
+              <a:ext uri="{91240B29-F687-4F45-9708-019B960494DF}">
+                <a14:hiddenLine xmlns:a14="http://schemas.microsoft.com/office/drawing/2010/main" w="9525">
+                  <a:solidFill>
+                    <a:schemeClr val="tx1"/>
+                  </a:solidFill>
+                  <a:miter lim="800000"/>
+                  <a:headEnd/>
+                  <a:tailEnd/>
+                </a14:hiddenLine>
               </a:ext>
             </a:extLst>
-          </a:blip>
-          <a:srcRect l="-18111" t="4727" r="18111" b="14991"/>
-          <a:stretch/>
-        </p:blipFill>
-        <p:spPr bwMode="auto">
-          <a:xfrm>
-            <a:off x="4572000" y="4730661"/>
-            <a:ext cx="2963517" cy="2032037"/>
-          </a:xfrm>
-          <a:prstGeom prst="rect">
-            <a:avLst/>
-          </a:prstGeom>
-          <a:noFill/>
-          <a:ln>
-            <a:noFill/>
-          </a:ln>
-          <a:extLst>
-            <a:ext uri="{909E8E84-426E-40DD-AFC4-6F175D3DCCD1}">
-              <a14:hiddenFill xmlns:a14="http://schemas.microsoft.com/office/drawing/2010/main">
-                <a:solidFill>
-                  <a:schemeClr val="accent1"/>
-                </a:solidFill>
-              </a14:hiddenFill>
-            </a:ext>
-            <a:ext uri="{91240B29-F687-4F45-9708-019B960494DF}">
-              <a14:hiddenLine xmlns:a14="http://schemas.microsoft.com/office/drawing/2010/main" w="9525">
-                <a:solidFill>
-                  <a:schemeClr val="tx1"/>
-                </a:solidFill>
-                <a:miter lim="800000"/>
-                <a:headEnd/>
-                <a:tailEnd/>
-              </a14:hiddenLine>
-            </a:ext>
-          </a:extLst>
-        </p:spPr>
-      </p:pic>
+          </p:spPr>
+        </p:pic>
+      </p:grpSp>
       <p:cxnSp>
         <p:nvCxnSpPr>
           <p:cNvPr id="8" name="Straight Connector 7"/>
@@ -3942,7 +4378,7 @@
 </p:sld>
 </file>
 
-<file path=ppt/slides/slide4.xml><?xml version="1.0" encoding="utf-8"?>
+<file path=ppt/slides/slide5.xml><?xml version="1.0" encoding="utf-8"?>
 <p:sld xmlns:a="http://schemas.openxmlformats.org/drawingml/2006/main" xmlns:r="http://schemas.openxmlformats.org/officeDocument/2006/relationships" xmlns:p="http://schemas.openxmlformats.org/presentationml/2006/main">
   <p:cSld>
     <p:spTree>
@@ -4115,7 +4551,7 @@
 </p:sld>
 </file>
 
-<file path=ppt/slides/slide5.xml><?xml version="1.0" encoding="utf-8"?>
+<file path=ppt/slides/slide6.xml><?xml version="1.0" encoding="utf-8"?>
 <p:sld xmlns:a="http://schemas.openxmlformats.org/drawingml/2006/main" xmlns:r="http://schemas.openxmlformats.org/officeDocument/2006/relationships" xmlns:p="http://schemas.openxmlformats.org/presentationml/2006/main">
   <p:cSld>
     <p:spTree>
@@ -4306,7 +4742,7 @@
 </p:sld>
 </file>
 
-<file path=ppt/slides/slide6.xml><?xml version="1.0" encoding="utf-8"?>
+<file path=ppt/slides/slide7.xml><?xml version="1.0" encoding="utf-8"?>
 <p:sld xmlns:a="http://schemas.openxmlformats.org/drawingml/2006/main" xmlns:r="http://schemas.openxmlformats.org/officeDocument/2006/relationships" xmlns:p="http://schemas.openxmlformats.org/presentationml/2006/main">
   <p:cSld>
     <p:spTree>
@@ -4608,7 +5044,7 @@
 </p:sld>
 </file>
 
-<file path=ppt/slides/slide7.xml><?xml version="1.0" encoding="utf-8"?>
+<file path=ppt/slides/slide8.xml><?xml version="1.0" encoding="utf-8"?>
 <p:sld xmlns:a="http://schemas.openxmlformats.org/drawingml/2006/main" xmlns:r="http://schemas.openxmlformats.org/officeDocument/2006/relationships" xmlns:p="http://schemas.openxmlformats.org/presentationml/2006/main">
   <p:cSld>
     <p:spTree>
@@ -4865,7 +5301,7 @@
 </p:sld>
 </file>
 
-<file path=ppt/slides/slide8.xml><?xml version="1.0" encoding="utf-8"?>
+<file path=ppt/slides/slide9.xml><?xml version="1.0" encoding="utf-8"?>
 <p:sld xmlns:a="http://schemas.openxmlformats.org/drawingml/2006/main" xmlns:r="http://schemas.openxmlformats.org/officeDocument/2006/relationships" xmlns:p="http://schemas.openxmlformats.org/presentationml/2006/main">
   <p:cSld>
     <p:spTree>
@@ -4995,142 +5431,6 @@
     <p:extLst>
       <p:ext uri="{BB962C8B-B14F-4D97-AF65-F5344CB8AC3E}">
         <p14:creationId xmlns:p14="http://schemas.microsoft.com/office/powerpoint/2010/main" val="3863097333"/>
-      </p:ext>
-    </p:extLst>
-  </p:cSld>
-  <p:clrMapOvr>
-    <a:masterClrMapping/>
-  </p:clrMapOvr>
-</p:sld>
-</file>
-
-<file path=ppt/slides/slide9.xml><?xml version="1.0" encoding="utf-8"?>
-<p:sld xmlns:a="http://schemas.openxmlformats.org/drawingml/2006/main" xmlns:r="http://schemas.openxmlformats.org/officeDocument/2006/relationships" xmlns:p="http://schemas.openxmlformats.org/presentationml/2006/main">
-  <p:cSld>
-    <p:spTree>
-      <p:nvGrpSpPr>
-        <p:cNvPr id="1" name=""/>
-        <p:cNvGrpSpPr/>
-        <p:nvPr/>
-      </p:nvGrpSpPr>
-      <p:grpSpPr>
-        <a:xfrm>
-          <a:off x="0" y="0"/>
-          <a:ext cx="0" cy="0"/>
-          <a:chOff x="0" y="0"/>
-          <a:chExt cx="0" cy="0"/>
-        </a:xfrm>
-      </p:grpSpPr>
-      <p:sp>
-        <p:nvSpPr>
-          <p:cNvPr id="2" name="Title 1"/>
-          <p:cNvSpPr>
-            <a:spLocks noGrp="1"/>
-          </p:cNvSpPr>
-          <p:nvPr>
-            <p:ph type="title"/>
-          </p:nvPr>
-        </p:nvSpPr>
-        <p:spPr/>
-        <p:txBody>
-          <a:bodyPr/>
-          <a:lstStyle/>
-          <a:p>
-            <a:r>
-              <a:rPr lang="en-US" dirty="0" smtClean="0"/>
-              <a:t>Initial Results</a:t>
-            </a:r>
-            <a:endParaRPr lang="en-US" dirty="0"/>
-          </a:p>
-        </p:txBody>
-      </p:sp>
-      <p:sp>
-        <p:nvSpPr>
-          <p:cNvPr id="3" name="Content Placeholder 2"/>
-          <p:cNvSpPr>
-            <a:spLocks noGrp="1"/>
-          </p:cNvSpPr>
-          <p:nvPr>
-            <p:ph idx="1"/>
-          </p:nvPr>
-        </p:nvSpPr>
-        <p:spPr/>
-        <p:txBody>
-          <a:bodyPr/>
-          <a:lstStyle/>
-          <a:p>
-            <a:pPr marL="0" indent="0">
-              <a:buNone/>
-            </a:pPr>
-            <a:r>
-              <a:rPr lang="en-US" dirty="0" smtClean="0"/>
-              <a:t>Demo Video</a:t>
-            </a:r>
-          </a:p>
-          <a:p>
-            <a:pPr marL="0" indent="0">
-              <a:buNone/>
-            </a:pPr>
-            <a:endParaRPr lang="en-US" dirty="0"/>
-          </a:p>
-          <a:p>
-            <a:pPr marL="0" indent="0">
-              <a:buNone/>
-            </a:pPr>
-            <a:r>
-              <a:rPr lang="en-US" dirty="0">
-                <a:hlinkClick r:id="rId2"/>
-              </a:rPr>
-              <a:t>https://</a:t>
-            </a:r>
-            <a:r>
-              <a:rPr lang="en-US" dirty="0" smtClean="0">
-                <a:hlinkClick r:id="rId2"/>
-              </a:rPr>
-              <a:t>www.youtube.com/watch?v=i7Q_NUDL1eU</a:t>
-            </a:r>
-            <a:r>
-              <a:rPr lang="en-US" dirty="0" smtClean="0"/>
-              <a:t> </a:t>
-            </a:r>
-          </a:p>
-        </p:txBody>
-      </p:sp>
-      <p:cxnSp>
-        <p:nvCxnSpPr>
-          <p:cNvPr id="4" name="Straight Connector 3"/>
-          <p:cNvCxnSpPr/>
-          <p:nvPr/>
-        </p:nvCxnSpPr>
-        <p:spPr>
-          <a:xfrm flipV="1">
-            <a:off x="0" y="1343771"/>
-            <a:ext cx="9144000" cy="1"/>
-          </a:xfrm>
-          <a:prstGeom prst="line">
-            <a:avLst/>
-          </a:prstGeom>
-          <a:ln/>
-        </p:spPr>
-        <p:style>
-          <a:lnRef idx="3">
-            <a:schemeClr val="dk1"/>
-          </a:lnRef>
-          <a:fillRef idx="0">
-            <a:schemeClr val="dk1"/>
-          </a:fillRef>
-          <a:effectRef idx="2">
-            <a:schemeClr val="dk1"/>
-          </a:effectRef>
-          <a:fontRef idx="minor">
-            <a:schemeClr val="tx1"/>
-          </a:fontRef>
-        </p:style>
-      </p:cxnSp>
-    </p:spTree>
-    <p:extLst>
-      <p:ext uri="{BB962C8B-B14F-4D97-AF65-F5344CB8AC3E}">
-        <p14:creationId xmlns:p14="http://schemas.microsoft.com/office/powerpoint/2010/main" val="3448217825"/>
       </p:ext>
     </p:extLst>
   </p:cSld>

</xml_diff>

<commit_message>
More changes to midpoint slides
</commit_message>
<xml_diff>
--- a/Midpoint Presentation/6.S079MidpointPresentation.pptx
+++ b/Midpoint Presentation/6.S079MidpointPresentation.pptx
@@ -3312,6 +3312,13 @@
   <p:clrMapOvr>
     <a:masterClrMapping/>
   </p:clrMapOvr>
+  <p:timing>
+    <p:tnLst>
+      <p:par>
+        <p:cTn id="1" dur="indefinite" restart="never" nodeType="tmRoot"/>
+      </p:par>
+    </p:tnLst>
+  </p:timing>
 </p:sld>
 </file>
 
@@ -3435,6 +3442,13 @@
   <p:clrMapOvr>
     <a:masterClrMapping/>
   </p:clrMapOvr>
+  <p:timing>
+    <p:tnLst>
+      <p:par>
+        <p:cTn id="1" dur="indefinite" restart="never" nodeType="tmRoot"/>
+      </p:par>
+    </p:tnLst>
+  </p:timing>
 </p:sld>
 </file>
 
@@ -3574,6 +3588,13 @@
   <p:clrMapOvr>
     <a:masterClrMapping/>
   </p:clrMapOvr>
+  <p:timing>
+    <p:tnLst>
+      <p:par>
+        <p:cTn id="1" dur="indefinite" restart="never" nodeType="tmRoot"/>
+      </p:par>
+    </p:tnLst>
+  </p:timing>
 </p:sld>
 </file>
 
@@ -3690,6 +3711,13 @@
   <p:clrMapOvr>
     <a:masterClrMapping/>
   </p:clrMapOvr>
+  <p:timing>
+    <p:tnLst>
+      <p:par>
+        <p:cTn id="1" dur="indefinite" restart="never" nodeType="tmRoot"/>
+      </p:par>
+    </p:tnLst>
+  </p:timing>
 </p:sld>
 </file>
 
@@ -3899,7 +3927,7 @@
         <p:spPr>
           <a:xfrm>
             <a:off x="457200" y="916464"/>
-            <a:ext cx="8415254" cy="1231106"/>
+            <a:ext cx="8415254" cy="954107"/>
           </a:xfrm>
           <a:prstGeom prst="rect">
             <a:avLst/>
@@ -3932,11 +3960,8 @@
             </a:pPr>
             <a:r>
               <a:rPr lang="en-US" sz="2800" dirty="0" smtClean="0"/>
-              <a:t>We took the resources and derived hexahedral FEM</a:t>
-            </a:r>
-            <a:endParaRPr lang="en-US" sz="2800" dirty="0"/>
-          </a:p>
-          <a:p>
+              <a:t>We took the derived all results ourselves</a:t>
+            </a:r>
             <a:endParaRPr lang="en-US" dirty="0"/>
           </a:p>
         </p:txBody>
@@ -3982,6 +4007,37 @@
           </a:extLst>
         </p:spPr>
       </p:pic>
+      <p:cxnSp>
+        <p:nvCxnSpPr>
+          <p:cNvPr id="8" name="Straight Connector 7"/>
+          <p:cNvCxnSpPr/>
+          <p:nvPr/>
+        </p:nvCxnSpPr>
+        <p:spPr>
+          <a:xfrm flipV="1">
+            <a:off x="0" y="916464"/>
+            <a:ext cx="9144000" cy="1"/>
+          </a:xfrm>
+          <a:prstGeom prst="line">
+            <a:avLst/>
+          </a:prstGeom>
+          <a:ln/>
+        </p:spPr>
+        <p:style>
+          <a:lnRef idx="3">
+            <a:schemeClr val="dk1"/>
+          </a:lnRef>
+          <a:fillRef idx="0">
+            <a:schemeClr val="dk1"/>
+          </a:fillRef>
+          <a:effectRef idx="2">
+            <a:schemeClr val="dk1"/>
+          </a:effectRef>
+          <a:fontRef idx="minor">
+            <a:schemeClr val="tx1"/>
+          </a:fontRef>
+        </p:style>
+      </p:cxnSp>
     </p:spTree>
     <p:extLst>
       <p:ext uri="{BB962C8B-B14F-4D97-AF65-F5344CB8AC3E}">
@@ -3992,6 +4048,13 @@
   <p:clrMapOvr>
     <a:masterClrMapping/>
   </p:clrMapOvr>
+  <p:timing>
+    <p:tnLst>
+      <p:par>
+        <p:cTn id="1" dur="indefinite" restart="never" nodeType="tmRoot"/>
+      </p:par>
+    </p:tnLst>
+  </p:timing>
 </p:sld>
 </file>
 
@@ -4096,12 +4159,8 @@
           </a:p>
           <a:p>
             <a:r>
-              <a:rPr lang="en-US" smtClean="0"/>
-              <a:t>Force applied </a:t>
-            </a:r>
-            <a:r>
               <a:rPr lang="en-US" dirty="0" smtClean="0"/>
-              <a:t>at vertices causes cube deformation to minimize potential energy </a:t>
+              <a:t>Forces at vertices causes cube deformation to minimize potential energy </a:t>
             </a:r>
             <a:endParaRPr lang="en-US" dirty="0" smtClean="0"/>
           </a:p>
@@ -4143,7 +4202,7 @@
         </p:blipFill>
         <p:spPr bwMode="auto">
           <a:xfrm>
-            <a:off x="5229726" y="4754957"/>
+            <a:off x="5257800" y="4754955"/>
             <a:ext cx="3886200" cy="1234285"/>
           </a:xfrm>
           <a:prstGeom prst="rect">
@@ -4365,6 +4424,75 @@
           </a:fontRef>
         </p:style>
       </p:cxnSp>
+      <p:cxnSp>
+        <p:nvCxnSpPr>
+          <p:cNvPr id="7" name="Straight Arrow Connector 6"/>
+          <p:cNvCxnSpPr/>
+          <p:nvPr/>
+        </p:nvCxnSpPr>
+        <p:spPr>
+          <a:xfrm flipV="1">
+            <a:off x="6172200" y="5486400"/>
+            <a:ext cx="381000" cy="545068"/>
+          </a:xfrm>
+          <a:prstGeom prst="straightConnector1">
+            <a:avLst/>
+          </a:prstGeom>
+          <a:ln>
+            <a:solidFill>
+              <a:schemeClr val="tx1"/>
+            </a:solidFill>
+            <a:tailEnd type="arrow"/>
+          </a:ln>
+        </p:spPr>
+        <p:style>
+          <a:lnRef idx="1">
+            <a:schemeClr val="accent1"/>
+          </a:lnRef>
+          <a:fillRef idx="0">
+            <a:schemeClr val="accent1"/>
+          </a:fillRef>
+          <a:effectRef idx="0">
+            <a:schemeClr val="accent1"/>
+          </a:effectRef>
+          <a:fontRef idx="minor">
+            <a:schemeClr val="tx1"/>
+          </a:fontRef>
+        </p:style>
+      </p:cxnSp>
+      <p:sp>
+        <p:nvSpPr>
+          <p:cNvPr id="10" name="TextBox 9"/>
+          <p:cNvSpPr txBox="1"/>
+          <p:nvPr/>
+        </p:nvSpPr>
+        <p:spPr>
+          <a:xfrm>
+            <a:off x="5143500" y="6031468"/>
+            <a:ext cx="2514600" cy="369332"/>
+          </a:xfrm>
+          <a:prstGeom prst="rect">
+            <a:avLst/>
+          </a:prstGeom>
+          <a:noFill/>
+          <a:ln>
+            <a:noFill/>
+          </a:ln>
+        </p:spPr>
+        <p:txBody>
+          <a:bodyPr wrap="square" rtlCol="0">
+            <a:spAutoFit/>
+          </a:bodyPr>
+          <a:lstStyle/>
+          <a:p>
+            <a:r>
+              <a:rPr lang="en-US" dirty="0" smtClean="0"/>
+              <a:t>Strain Energy Function</a:t>
+            </a:r>
+            <a:endParaRPr lang="en-US" dirty="0"/>
+          </a:p>
+        </p:txBody>
+      </p:sp>
     </p:spTree>
     <p:extLst>
       <p:ext uri="{BB962C8B-B14F-4D97-AF65-F5344CB8AC3E}">
@@ -4375,6 +4503,13 @@
   <p:clrMapOvr>
     <a:masterClrMapping/>
   </p:clrMapOvr>
+  <p:timing>
+    <p:tnLst>
+      <p:par>
+        <p:cTn id="1" dur="indefinite" restart="never" nodeType="tmRoot"/>
+      </p:par>
+    </p:tnLst>
+  </p:timing>
 </p:sld>
 </file>
 
@@ -4548,6 +4683,13 @@
   <p:clrMapOvr>
     <a:masterClrMapping/>
   </p:clrMapOvr>
+  <p:timing>
+    <p:tnLst>
+      <p:par>
+        <p:cTn id="1" dur="indefinite" restart="never" nodeType="tmRoot"/>
+      </p:par>
+    </p:tnLst>
+  </p:timing>
 </p:sld>
 </file>
 
@@ -4739,6 +4881,13 @@
   <p:clrMapOvr>
     <a:masterClrMapping/>
   </p:clrMapOvr>
+  <p:timing>
+    <p:tnLst>
+      <p:par>
+        <p:cTn id="1" dur="indefinite" restart="never" nodeType="tmRoot"/>
+      </p:par>
+    </p:tnLst>
+  </p:timing>
 </p:sld>
 </file>
 
@@ -5031,6 +5180,58 @@
           </a:fontRef>
         </p:style>
       </p:cxnSp>
+      <p:pic>
+        <p:nvPicPr>
+          <p:cNvPr id="8" name="Picture 2"/>
+          <p:cNvPicPr>
+            <a:picLocks noChangeAspect="1" noChangeArrowheads="1"/>
+          </p:cNvPicPr>
+          <p:nvPr/>
+        </p:nvPicPr>
+        <p:blipFill rotWithShape="1">
+          <a:blip r:embed="rId3">
+            <a:extLst>
+              <a:ext uri="{28A0092B-C50C-407E-A947-70E740481C1C}">
+                <a14:useLocalDpi xmlns:a14="http://schemas.microsoft.com/office/drawing/2010/main" val="0"/>
+              </a:ext>
+            </a:extLst>
+          </a:blip>
+          <a:srcRect r="77419"/>
+          <a:stretch/>
+        </p:blipFill>
+        <p:spPr bwMode="auto">
+          <a:xfrm>
+            <a:off x="8001000" y="3505200"/>
+            <a:ext cx="533400" cy="484955"/>
+          </a:xfrm>
+          <a:prstGeom prst="rect">
+            <a:avLst/>
+          </a:prstGeom>
+          <a:noFill/>
+          <a:ln>
+            <a:noFill/>
+          </a:ln>
+          <a:extLst>
+            <a:ext uri="{909E8E84-426E-40DD-AFC4-6F175D3DCCD1}">
+              <a14:hiddenFill xmlns:a14="http://schemas.microsoft.com/office/drawing/2010/main">
+                <a:solidFill>
+                  <a:schemeClr val="accent1"/>
+                </a:solidFill>
+              </a14:hiddenFill>
+            </a:ext>
+            <a:ext uri="{91240B29-F687-4F45-9708-019B960494DF}">
+              <a14:hiddenLine xmlns:a14="http://schemas.microsoft.com/office/drawing/2010/main" w="9525">
+                <a:solidFill>
+                  <a:schemeClr val="tx1"/>
+                </a:solidFill>
+                <a:miter lim="800000"/>
+                <a:headEnd/>
+                <a:tailEnd/>
+              </a14:hiddenLine>
+            </a:ext>
+          </a:extLst>
+        </p:spPr>
+      </p:pic>
     </p:spTree>
     <p:extLst>
       <p:ext uri="{BB962C8B-B14F-4D97-AF65-F5344CB8AC3E}">
@@ -5041,6 +5242,13 @@
   <p:clrMapOvr>
     <a:masterClrMapping/>
   </p:clrMapOvr>
+  <p:timing>
+    <p:tnLst>
+      <p:par>
+        <p:cTn id="1" dur="indefinite" restart="never" nodeType="tmRoot"/>
+      </p:par>
+    </p:tnLst>
+  </p:timing>
 </p:sld>
 </file>
 
@@ -5298,6 +5506,13 @@
   <p:clrMapOvr>
     <a:masterClrMapping/>
   </p:clrMapOvr>
+  <p:timing>
+    <p:tnLst>
+      <p:par>
+        <p:cTn id="1" dur="indefinite" restart="never" nodeType="tmRoot"/>
+      </p:par>
+    </p:tnLst>
+  </p:timing>
 </p:sld>
 </file>
 
@@ -5372,7 +5587,11 @@
             <a:pPr lvl="1"/>
             <a:r>
               <a:rPr lang="en-US" dirty="0" smtClean="0"/>
-              <a:t>Will use cusp</a:t>
+              <a:t>Will use </a:t>
+            </a:r>
+            <a:r>
+              <a:rPr lang="en-US" dirty="0" smtClean="0"/>
+              <a:t>cusp (CUDA assisted sparse matrix solver)</a:t>
             </a:r>
             <a:endParaRPr lang="en-US" dirty="0"/>
           </a:p>
@@ -5437,6 +5656,13 @@
   <p:clrMapOvr>
     <a:masterClrMapping/>
   </p:clrMapOvr>
+  <p:timing>
+    <p:tnLst>
+      <p:par>
+        <p:cTn id="1" dur="indefinite" restart="never" nodeType="tmRoot"/>
+      </p:par>
+    </p:tnLst>
+  </p:timing>
 </p:sld>
 </file>
 

</xml_diff>